<commit_message>
fixed reference on slide 13
PropertyValueSpecification
</commit_message>
<xml_diff>
--- a/iot.schema.org-19042018.pptx
+++ b/iot.schema.org-19042018.pptx
@@ -6129,11 +6129,15 @@
             <a:pPr lvl="1"/>
             <a:r>
               <a:rPr lang="en-US" dirty="0" err="1" smtClean="0"/>
-              <a:t>PropertyValueConstraint</a:t>
-            </a:r>
-            <a:r>
-              <a:rPr lang="en-US" dirty="0" smtClean="0"/>
-              <a:t> (</a:t>
+              <a:t>PropertyValueSpecification</a:t>
+            </a:r>
+            <a:r>
+              <a:rPr lang="en-US" dirty="0" smtClean="0"/>
+              <a:t> </a:t>
+            </a:r>
+            <a:r>
+              <a:rPr lang="en-US" dirty="0" smtClean="0"/>
+              <a:t>(</a:t>
             </a:r>
             <a:r>
               <a:rPr lang="en-US" dirty="0" err="1" smtClean="0"/>
@@ -7457,7 +7461,7 @@
               <a:t>and </a:t>
             </a:r>
             <a:r>
-              <a:rPr lang="en-US" smtClean="0"/>
+              <a:rPr lang="en-US" dirty="0" smtClean="0"/>
               <a:t>Features of Interest</a:t>
             </a:r>
             <a:endParaRPr lang="en-US" dirty="0" smtClean="0"/>

</xml_diff>